<commit_message>
ListView Update Test commit 2
</commit_message>
<xml_diff>
--- a/1122수업.pptx
+++ b/1122수업.pptx
@@ -112,6 +112,11 @@
       </a:defRPr>
     </a:lvl9pPr>
   </p:defaultTextStyle>
+  <p:extLst>
+    <p:ext uri="{EFAFB233-063F-42B5-8137-9DF3F51BA10A}">
+      <p15:sldGuideLst xmlns:p15="http://schemas.microsoft.com/office/powerpoint/2012/main"/>
+    </p:ext>
+  </p:extLst>
 </p:presentation>
 </file>
 
@@ -157,10 +162,9 @@
           </a:lstStyle>
           <a:p>
             <a:r>
-              <a:rPr lang="ko-KR" altLang="en-US" smtClean="0"/>
+              <a:rPr lang="ko-KR" altLang="en-US"/>
               <a:t>마스터 제목 스타일 편집</a:t>
             </a:r>
-            <a:endParaRPr lang="ko-KR" altLang="en-US"/>
           </a:p>
         </p:txBody>
       </p:sp>
@@ -222,10 +226,9 @@
           </a:lstStyle>
           <a:p>
             <a:r>
-              <a:rPr lang="ko-KR" altLang="en-US" smtClean="0"/>
+              <a:rPr lang="ko-KR" altLang="en-US"/>
               <a:t>클릭하여 마스터 부제목 스타일 편집</a:t>
             </a:r>
-            <a:endParaRPr lang="ko-KR" altLang="en-US"/>
           </a:p>
         </p:txBody>
       </p:sp>
@@ -246,7 +249,7 @@
           <a:p>
             <a:fld id="{7A210019-F0D1-4899-9B97-B63D89A03EBA}" type="datetimeFigureOut">
               <a:rPr lang="ko-KR" altLang="en-US" smtClean="0"/>
-              <a:t>2018-11-22</a:t>
+              <a:t>2018-11-25</a:t>
             </a:fld>
             <a:endParaRPr lang="ko-KR" altLang="en-US"/>
           </a:p>
@@ -340,10 +343,9 @@
           <a:lstStyle/>
           <a:p>
             <a:r>
-              <a:rPr lang="ko-KR" altLang="en-US" smtClean="0"/>
+              <a:rPr lang="ko-KR" altLang="en-US"/>
               <a:t>마스터 제목 스타일 편집</a:t>
             </a:r>
-            <a:endParaRPr lang="ko-KR" altLang="en-US"/>
           </a:p>
         </p:txBody>
       </p:sp>
@@ -364,38 +366,37 @@
           <a:p>
             <a:pPr lvl="0"/>
             <a:r>
-              <a:rPr lang="ko-KR" altLang="en-US" smtClean="0"/>
+              <a:rPr lang="ko-KR" altLang="en-US"/>
               <a:t>마스터 텍스트 스타일 편집</a:t>
             </a:r>
           </a:p>
           <a:p>
             <a:pPr lvl="1"/>
             <a:r>
-              <a:rPr lang="ko-KR" altLang="en-US" smtClean="0"/>
+              <a:rPr lang="ko-KR" altLang="en-US"/>
               <a:t>둘째 수준</a:t>
             </a:r>
           </a:p>
           <a:p>
             <a:pPr lvl="2"/>
             <a:r>
-              <a:rPr lang="ko-KR" altLang="en-US" smtClean="0"/>
+              <a:rPr lang="ko-KR" altLang="en-US"/>
               <a:t>셋째 수준</a:t>
             </a:r>
           </a:p>
           <a:p>
             <a:pPr lvl="3"/>
             <a:r>
-              <a:rPr lang="ko-KR" altLang="en-US" smtClean="0"/>
+              <a:rPr lang="ko-KR" altLang="en-US"/>
               <a:t>넷째 수준</a:t>
             </a:r>
           </a:p>
           <a:p>
             <a:pPr lvl="4"/>
             <a:r>
-              <a:rPr lang="ko-KR" altLang="en-US" smtClean="0"/>
+              <a:rPr lang="ko-KR" altLang="en-US"/>
               <a:t>다섯째 수준</a:t>
             </a:r>
-            <a:endParaRPr lang="ko-KR" altLang="en-US"/>
           </a:p>
         </p:txBody>
       </p:sp>
@@ -416,7 +417,7 @@
           <a:p>
             <a:fld id="{7A210019-F0D1-4899-9B97-B63D89A03EBA}" type="datetimeFigureOut">
               <a:rPr lang="ko-KR" altLang="en-US" smtClean="0"/>
-              <a:t>2018-11-22</a:t>
+              <a:t>2018-11-25</a:t>
             </a:fld>
             <a:endParaRPr lang="ko-KR" altLang="en-US"/>
           </a:p>
@@ -515,10 +516,9 @@
           <a:lstStyle/>
           <a:p>
             <a:r>
-              <a:rPr lang="ko-KR" altLang="en-US" smtClean="0"/>
+              <a:rPr lang="ko-KR" altLang="en-US"/>
               <a:t>마스터 제목 스타일 편집</a:t>
             </a:r>
-            <a:endParaRPr lang="ko-KR" altLang="en-US"/>
           </a:p>
         </p:txBody>
       </p:sp>
@@ -544,38 +544,37 @@
           <a:p>
             <a:pPr lvl="0"/>
             <a:r>
-              <a:rPr lang="ko-KR" altLang="en-US" smtClean="0"/>
+              <a:rPr lang="ko-KR" altLang="en-US"/>
               <a:t>마스터 텍스트 스타일 편집</a:t>
             </a:r>
           </a:p>
           <a:p>
             <a:pPr lvl="1"/>
             <a:r>
-              <a:rPr lang="ko-KR" altLang="en-US" smtClean="0"/>
+              <a:rPr lang="ko-KR" altLang="en-US"/>
               <a:t>둘째 수준</a:t>
             </a:r>
           </a:p>
           <a:p>
             <a:pPr lvl="2"/>
             <a:r>
-              <a:rPr lang="ko-KR" altLang="en-US" smtClean="0"/>
+              <a:rPr lang="ko-KR" altLang="en-US"/>
               <a:t>셋째 수준</a:t>
             </a:r>
           </a:p>
           <a:p>
             <a:pPr lvl="3"/>
             <a:r>
-              <a:rPr lang="ko-KR" altLang="en-US" smtClean="0"/>
+              <a:rPr lang="ko-KR" altLang="en-US"/>
               <a:t>넷째 수준</a:t>
             </a:r>
           </a:p>
           <a:p>
             <a:pPr lvl="4"/>
             <a:r>
-              <a:rPr lang="ko-KR" altLang="en-US" smtClean="0"/>
+              <a:rPr lang="ko-KR" altLang="en-US"/>
               <a:t>다섯째 수준</a:t>
             </a:r>
-            <a:endParaRPr lang="ko-KR" altLang="en-US"/>
           </a:p>
         </p:txBody>
       </p:sp>
@@ -596,7 +595,7 @@
           <a:p>
             <a:fld id="{7A210019-F0D1-4899-9B97-B63D89A03EBA}" type="datetimeFigureOut">
               <a:rPr lang="ko-KR" altLang="en-US" smtClean="0"/>
-              <a:t>2018-11-22</a:t>
+              <a:t>2018-11-25</a:t>
             </a:fld>
             <a:endParaRPr lang="ko-KR" altLang="en-US"/>
           </a:p>
@@ -690,10 +689,9 @@
           <a:lstStyle/>
           <a:p>
             <a:r>
-              <a:rPr lang="ko-KR" altLang="en-US" smtClean="0"/>
+              <a:rPr lang="ko-KR" altLang="en-US"/>
               <a:t>마스터 제목 스타일 편집</a:t>
             </a:r>
-            <a:endParaRPr lang="ko-KR" altLang="en-US"/>
           </a:p>
         </p:txBody>
       </p:sp>
@@ -714,38 +712,37 @@
           <a:p>
             <a:pPr lvl="0"/>
             <a:r>
-              <a:rPr lang="ko-KR" altLang="en-US" smtClean="0"/>
+              <a:rPr lang="ko-KR" altLang="en-US"/>
               <a:t>마스터 텍스트 스타일 편집</a:t>
             </a:r>
           </a:p>
           <a:p>
             <a:pPr lvl="1"/>
             <a:r>
-              <a:rPr lang="ko-KR" altLang="en-US" smtClean="0"/>
+              <a:rPr lang="ko-KR" altLang="en-US"/>
               <a:t>둘째 수준</a:t>
             </a:r>
           </a:p>
           <a:p>
             <a:pPr lvl="2"/>
             <a:r>
-              <a:rPr lang="ko-KR" altLang="en-US" smtClean="0"/>
+              <a:rPr lang="ko-KR" altLang="en-US"/>
               <a:t>셋째 수준</a:t>
             </a:r>
           </a:p>
           <a:p>
             <a:pPr lvl="3"/>
             <a:r>
-              <a:rPr lang="ko-KR" altLang="en-US" smtClean="0"/>
+              <a:rPr lang="ko-KR" altLang="en-US"/>
               <a:t>넷째 수준</a:t>
             </a:r>
           </a:p>
           <a:p>
             <a:pPr lvl="4"/>
             <a:r>
-              <a:rPr lang="ko-KR" altLang="en-US" smtClean="0"/>
+              <a:rPr lang="ko-KR" altLang="en-US"/>
               <a:t>다섯째 수준</a:t>
             </a:r>
-            <a:endParaRPr lang="ko-KR" altLang="en-US"/>
           </a:p>
         </p:txBody>
       </p:sp>
@@ -766,7 +763,7 @@
           <a:p>
             <a:fld id="{7A210019-F0D1-4899-9B97-B63D89A03EBA}" type="datetimeFigureOut">
               <a:rPr lang="ko-KR" altLang="en-US" smtClean="0"/>
-              <a:t>2018-11-22</a:t>
+              <a:t>2018-11-25</a:t>
             </a:fld>
             <a:endParaRPr lang="ko-KR" altLang="en-US"/>
           </a:p>
@@ -869,10 +866,9 @@
           </a:lstStyle>
           <a:p>
             <a:r>
-              <a:rPr lang="ko-KR" altLang="en-US" smtClean="0"/>
+              <a:rPr lang="ko-KR" altLang="en-US"/>
               <a:t>마스터 제목 스타일 편집</a:t>
             </a:r>
-            <a:endParaRPr lang="ko-KR" altLang="en-US"/>
           </a:p>
         </p:txBody>
       </p:sp>
@@ -989,7 +985,7 @@
           <a:p>
             <a:pPr lvl="0"/>
             <a:r>
-              <a:rPr lang="ko-KR" altLang="en-US" smtClean="0"/>
+              <a:rPr lang="ko-KR" altLang="en-US"/>
               <a:t>마스터 텍스트 스타일 편집</a:t>
             </a:r>
           </a:p>
@@ -1012,7 +1008,7 @@
           <a:p>
             <a:fld id="{7A210019-F0D1-4899-9B97-B63D89A03EBA}" type="datetimeFigureOut">
               <a:rPr lang="ko-KR" altLang="en-US" smtClean="0"/>
-              <a:t>2018-11-22</a:t>
+              <a:t>2018-11-25</a:t>
             </a:fld>
             <a:endParaRPr lang="ko-KR" altLang="en-US"/>
           </a:p>
@@ -1106,10 +1102,9 @@
           <a:lstStyle/>
           <a:p>
             <a:r>
-              <a:rPr lang="ko-KR" altLang="en-US" smtClean="0"/>
+              <a:rPr lang="ko-KR" altLang="en-US"/>
               <a:t>마스터 제목 스타일 편집</a:t>
             </a:r>
-            <a:endParaRPr lang="ko-KR" altLang="en-US"/>
           </a:p>
         </p:txBody>
       </p:sp>
@@ -1135,38 +1130,37 @@
           <a:p>
             <a:pPr lvl="0"/>
             <a:r>
-              <a:rPr lang="ko-KR" altLang="en-US" smtClean="0"/>
+              <a:rPr lang="ko-KR" altLang="en-US"/>
               <a:t>마스터 텍스트 스타일 편집</a:t>
             </a:r>
           </a:p>
           <a:p>
             <a:pPr lvl="1"/>
             <a:r>
-              <a:rPr lang="ko-KR" altLang="en-US" smtClean="0"/>
+              <a:rPr lang="ko-KR" altLang="en-US"/>
               <a:t>둘째 수준</a:t>
             </a:r>
           </a:p>
           <a:p>
             <a:pPr lvl="2"/>
             <a:r>
-              <a:rPr lang="ko-KR" altLang="en-US" smtClean="0"/>
+              <a:rPr lang="ko-KR" altLang="en-US"/>
               <a:t>셋째 수준</a:t>
             </a:r>
           </a:p>
           <a:p>
             <a:pPr lvl="3"/>
             <a:r>
-              <a:rPr lang="ko-KR" altLang="en-US" smtClean="0"/>
+              <a:rPr lang="ko-KR" altLang="en-US"/>
               <a:t>넷째 수준</a:t>
             </a:r>
           </a:p>
           <a:p>
             <a:pPr lvl="4"/>
             <a:r>
-              <a:rPr lang="ko-KR" altLang="en-US" smtClean="0"/>
+              <a:rPr lang="ko-KR" altLang="en-US"/>
               <a:t>다섯째 수준</a:t>
             </a:r>
-            <a:endParaRPr lang="ko-KR" altLang="en-US"/>
           </a:p>
         </p:txBody>
       </p:sp>
@@ -1192,38 +1186,37 @@
           <a:p>
             <a:pPr lvl="0"/>
             <a:r>
-              <a:rPr lang="ko-KR" altLang="en-US" smtClean="0"/>
+              <a:rPr lang="ko-KR" altLang="en-US"/>
               <a:t>마스터 텍스트 스타일 편집</a:t>
             </a:r>
           </a:p>
           <a:p>
             <a:pPr lvl="1"/>
             <a:r>
-              <a:rPr lang="ko-KR" altLang="en-US" smtClean="0"/>
+              <a:rPr lang="ko-KR" altLang="en-US"/>
               <a:t>둘째 수준</a:t>
             </a:r>
           </a:p>
           <a:p>
             <a:pPr lvl="2"/>
             <a:r>
-              <a:rPr lang="ko-KR" altLang="en-US" smtClean="0"/>
+              <a:rPr lang="ko-KR" altLang="en-US"/>
               <a:t>셋째 수준</a:t>
             </a:r>
           </a:p>
           <a:p>
             <a:pPr lvl="3"/>
             <a:r>
-              <a:rPr lang="ko-KR" altLang="en-US" smtClean="0"/>
+              <a:rPr lang="ko-KR" altLang="en-US"/>
               <a:t>넷째 수준</a:t>
             </a:r>
           </a:p>
           <a:p>
             <a:pPr lvl="4"/>
             <a:r>
-              <a:rPr lang="ko-KR" altLang="en-US" smtClean="0"/>
+              <a:rPr lang="ko-KR" altLang="en-US"/>
               <a:t>다섯째 수준</a:t>
             </a:r>
-            <a:endParaRPr lang="ko-KR" altLang="en-US"/>
           </a:p>
         </p:txBody>
       </p:sp>
@@ -1244,7 +1237,7 @@
           <a:p>
             <a:fld id="{7A210019-F0D1-4899-9B97-B63D89A03EBA}" type="datetimeFigureOut">
               <a:rPr lang="ko-KR" altLang="en-US" smtClean="0"/>
-              <a:t>2018-11-22</a:t>
+              <a:t>2018-11-25</a:t>
             </a:fld>
             <a:endParaRPr lang="ko-KR" altLang="en-US"/>
           </a:p>
@@ -1343,10 +1336,9 @@
           <a:lstStyle/>
           <a:p>
             <a:r>
-              <a:rPr lang="ko-KR" altLang="en-US" smtClean="0"/>
+              <a:rPr lang="ko-KR" altLang="en-US"/>
               <a:t>마스터 제목 스타일 편집</a:t>
             </a:r>
-            <a:endParaRPr lang="ko-KR" altLang="en-US"/>
           </a:p>
         </p:txBody>
       </p:sp>
@@ -1409,7 +1401,7 @@
           <a:p>
             <a:pPr lvl="0"/>
             <a:r>
-              <a:rPr lang="ko-KR" altLang="en-US" smtClean="0"/>
+              <a:rPr lang="ko-KR" altLang="en-US"/>
               <a:t>마스터 텍스트 스타일 편집</a:t>
             </a:r>
           </a:p>
@@ -1437,38 +1429,37 @@
           <a:p>
             <a:pPr lvl="0"/>
             <a:r>
-              <a:rPr lang="ko-KR" altLang="en-US" smtClean="0"/>
+              <a:rPr lang="ko-KR" altLang="en-US"/>
               <a:t>마스터 텍스트 스타일 편집</a:t>
             </a:r>
           </a:p>
           <a:p>
             <a:pPr lvl="1"/>
             <a:r>
-              <a:rPr lang="ko-KR" altLang="en-US" smtClean="0"/>
+              <a:rPr lang="ko-KR" altLang="en-US"/>
               <a:t>둘째 수준</a:t>
             </a:r>
           </a:p>
           <a:p>
             <a:pPr lvl="2"/>
             <a:r>
-              <a:rPr lang="ko-KR" altLang="en-US" smtClean="0"/>
+              <a:rPr lang="ko-KR" altLang="en-US"/>
               <a:t>셋째 수준</a:t>
             </a:r>
           </a:p>
           <a:p>
             <a:pPr lvl="3"/>
             <a:r>
-              <a:rPr lang="ko-KR" altLang="en-US" smtClean="0"/>
+              <a:rPr lang="ko-KR" altLang="en-US"/>
               <a:t>넷째 수준</a:t>
             </a:r>
           </a:p>
           <a:p>
             <a:pPr lvl="4"/>
             <a:r>
-              <a:rPr lang="ko-KR" altLang="en-US" smtClean="0"/>
+              <a:rPr lang="ko-KR" altLang="en-US"/>
               <a:t>다섯째 수준</a:t>
             </a:r>
-            <a:endParaRPr lang="ko-KR" altLang="en-US"/>
           </a:p>
         </p:txBody>
       </p:sp>
@@ -1531,7 +1522,7 @@
           <a:p>
             <a:pPr lvl="0"/>
             <a:r>
-              <a:rPr lang="ko-KR" altLang="en-US" smtClean="0"/>
+              <a:rPr lang="ko-KR" altLang="en-US"/>
               <a:t>마스터 텍스트 스타일 편집</a:t>
             </a:r>
           </a:p>
@@ -1559,38 +1550,37 @@
           <a:p>
             <a:pPr lvl="0"/>
             <a:r>
-              <a:rPr lang="ko-KR" altLang="en-US" smtClean="0"/>
+              <a:rPr lang="ko-KR" altLang="en-US"/>
               <a:t>마스터 텍스트 스타일 편집</a:t>
             </a:r>
           </a:p>
           <a:p>
             <a:pPr lvl="1"/>
             <a:r>
-              <a:rPr lang="ko-KR" altLang="en-US" smtClean="0"/>
+              <a:rPr lang="ko-KR" altLang="en-US"/>
               <a:t>둘째 수준</a:t>
             </a:r>
           </a:p>
           <a:p>
             <a:pPr lvl="2"/>
             <a:r>
-              <a:rPr lang="ko-KR" altLang="en-US" smtClean="0"/>
+              <a:rPr lang="ko-KR" altLang="en-US"/>
               <a:t>셋째 수준</a:t>
             </a:r>
           </a:p>
           <a:p>
             <a:pPr lvl="3"/>
             <a:r>
-              <a:rPr lang="ko-KR" altLang="en-US" smtClean="0"/>
+              <a:rPr lang="ko-KR" altLang="en-US"/>
               <a:t>넷째 수준</a:t>
             </a:r>
           </a:p>
           <a:p>
             <a:pPr lvl="4"/>
             <a:r>
-              <a:rPr lang="ko-KR" altLang="en-US" smtClean="0"/>
+              <a:rPr lang="ko-KR" altLang="en-US"/>
               <a:t>다섯째 수준</a:t>
             </a:r>
-            <a:endParaRPr lang="ko-KR" altLang="en-US"/>
           </a:p>
         </p:txBody>
       </p:sp>
@@ -1611,7 +1601,7 @@
           <a:p>
             <a:fld id="{7A210019-F0D1-4899-9B97-B63D89A03EBA}" type="datetimeFigureOut">
               <a:rPr lang="ko-KR" altLang="en-US" smtClean="0"/>
-              <a:t>2018-11-22</a:t>
+              <a:t>2018-11-25</a:t>
             </a:fld>
             <a:endParaRPr lang="ko-KR" altLang="en-US"/>
           </a:p>
@@ -1705,10 +1695,9 @@
           <a:lstStyle/>
           <a:p>
             <a:r>
-              <a:rPr lang="ko-KR" altLang="en-US" smtClean="0"/>
+              <a:rPr lang="ko-KR" altLang="en-US"/>
               <a:t>마스터 제목 스타일 편집</a:t>
             </a:r>
-            <a:endParaRPr lang="ko-KR" altLang="en-US"/>
           </a:p>
         </p:txBody>
       </p:sp>
@@ -1729,7 +1718,7 @@
           <a:p>
             <a:fld id="{7A210019-F0D1-4899-9B97-B63D89A03EBA}" type="datetimeFigureOut">
               <a:rPr lang="ko-KR" altLang="en-US" smtClean="0"/>
-              <a:t>2018-11-22</a:t>
+              <a:t>2018-11-25</a:t>
             </a:fld>
             <a:endParaRPr lang="ko-KR" altLang="en-US"/>
           </a:p>
@@ -1824,7 +1813,7 @@
           <a:p>
             <a:fld id="{7A210019-F0D1-4899-9B97-B63D89A03EBA}" type="datetimeFigureOut">
               <a:rPr lang="ko-KR" altLang="en-US" smtClean="0"/>
-              <a:t>2018-11-22</a:t>
+              <a:t>2018-11-25</a:t>
             </a:fld>
             <a:endParaRPr lang="ko-KR" altLang="en-US"/>
           </a:p>
@@ -1927,10 +1916,9 @@
           </a:lstStyle>
           <a:p>
             <a:r>
-              <a:rPr lang="ko-KR" altLang="en-US" smtClean="0"/>
+              <a:rPr lang="ko-KR" altLang="en-US"/>
               <a:t>마스터 제목 스타일 편집</a:t>
             </a:r>
-            <a:endParaRPr lang="ko-KR" altLang="en-US"/>
           </a:p>
         </p:txBody>
       </p:sp>
@@ -1984,38 +1972,37 @@
           <a:p>
             <a:pPr lvl="0"/>
             <a:r>
-              <a:rPr lang="ko-KR" altLang="en-US" smtClean="0"/>
+              <a:rPr lang="ko-KR" altLang="en-US"/>
               <a:t>마스터 텍스트 스타일 편집</a:t>
             </a:r>
           </a:p>
           <a:p>
             <a:pPr lvl="1"/>
             <a:r>
-              <a:rPr lang="ko-KR" altLang="en-US" smtClean="0"/>
+              <a:rPr lang="ko-KR" altLang="en-US"/>
               <a:t>둘째 수준</a:t>
             </a:r>
           </a:p>
           <a:p>
             <a:pPr lvl="2"/>
             <a:r>
-              <a:rPr lang="ko-KR" altLang="en-US" smtClean="0"/>
+              <a:rPr lang="ko-KR" altLang="en-US"/>
               <a:t>셋째 수준</a:t>
             </a:r>
           </a:p>
           <a:p>
             <a:pPr lvl="3"/>
             <a:r>
-              <a:rPr lang="ko-KR" altLang="en-US" smtClean="0"/>
+              <a:rPr lang="ko-KR" altLang="en-US"/>
               <a:t>넷째 수준</a:t>
             </a:r>
           </a:p>
           <a:p>
             <a:pPr lvl="4"/>
             <a:r>
-              <a:rPr lang="ko-KR" altLang="en-US" smtClean="0"/>
+              <a:rPr lang="ko-KR" altLang="en-US"/>
               <a:t>다섯째 수준</a:t>
             </a:r>
-            <a:endParaRPr lang="ko-KR" altLang="en-US"/>
           </a:p>
         </p:txBody>
       </p:sp>
@@ -2078,7 +2065,7 @@
           <a:p>
             <a:pPr lvl="0"/>
             <a:r>
-              <a:rPr lang="ko-KR" altLang="en-US" smtClean="0"/>
+              <a:rPr lang="ko-KR" altLang="en-US"/>
               <a:t>마스터 텍스트 스타일 편집</a:t>
             </a:r>
           </a:p>
@@ -2101,7 +2088,7 @@
           <a:p>
             <a:fld id="{7A210019-F0D1-4899-9B97-B63D89A03EBA}" type="datetimeFigureOut">
               <a:rPr lang="ko-KR" altLang="en-US" smtClean="0"/>
-              <a:t>2018-11-22</a:t>
+              <a:t>2018-11-25</a:t>
             </a:fld>
             <a:endParaRPr lang="ko-KR" altLang="en-US"/>
           </a:p>
@@ -2204,10 +2191,9 @@
           </a:lstStyle>
           <a:p>
             <a:r>
-              <a:rPr lang="ko-KR" altLang="en-US" smtClean="0"/>
+              <a:rPr lang="ko-KR" altLang="en-US"/>
               <a:t>마스터 제목 스타일 편집</a:t>
             </a:r>
-            <a:endParaRPr lang="ko-KR" altLang="en-US"/>
           </a:p>
         </p:txBody>
       </p:sp>
@@ -2331,7 +2317,7 @@
           <a:p>
             <a:pPr lvl="0"/>
             <a:r>
-              <a:rPr lang="ko-KR" altLang="en-US" smtClean="0"/>
+              <a:rPr lang="ko-KR" altLang="en-US"/>
               <a:t>마스터 텍스트 스타일 편집</a:t>
             </a:r>
           </a:p>
@@ -2354,7 +2340,7 @@
           <a:p>
             <a:fld id="{7A210019-F0D1-4899-9B97-B63D89A03EBA}" type="datetimeFigureOut">
               <a:rPr lang="ko-KR" altLang="en-US" smtClean="0"/>
-              <a:t>2018-11-22</a:t>
+              <a:t>2018-11-25</a:t>
             </a:fld>
             <a:endParaRPr lang="ko-KR" altLang="en-US"/>
           </a:p>
@@ -2463,10 +2449,9 @@
           <a:lstStyle/>
           <a:p>
             <a:r>
-              <a:rPr lang="ko-KR" altLang="en-US" smtClean="0"/>
+              <a:rPr lang="ko-KR" altLang="en-US"/>
               <a:t>마스터 제목 스타일 편집</a:t>
             </a:r>
-            <a:endParaRPr lang="ko-KR" altLang="en-US"/>
           </a:p>
         </p:txBody>
       </p:sp>
@@ -2497,38 +2482,37 @@
           <a:p>
             <a:pPr lvl="0"/>
             <a:r>
-              <a:rPr lang="ko-KR" altLang="en-US" smtClean="0"/>
+              <a:rPr lang="ko-KR" altLang="en-US"/>
               <a:t>마스터 텍스트 스타일 편집</a:t>
             </a:r>
           </a:p>
           <a:p>
             <a:pPr lvl="1"/>
             <a:r>
-              <a:rPr lang="ko-KR" altLang="en-US" smtClean="0"/>
+              <a:rPr lang="ko-KR" altLang="en-US"/>
               <a:t>둘째 수준</a:t>
             </a:r>
           </a:p>
           <a:p>
             <a:pPr lvl="2"/>
             <a:r>
-              <a:rPr lang="ko-KR" altLang="en-US" smtClean="0"/>
+              <a:rPr lang="ko-KR" altLang="en-US"/>
               <a:t>셋째 수준</a:t>
             </a:r>
           </a:p>
           <a:p>
             <a:pPr lvl="3"/>
             <a:r>
-              <a:rPr lang="ko-KR" altLang="en-US" smtClean="0"/>
+              <a:rPr lang="ko-KR" altLang="en-US"/>
               <a:t>넷째 수준</a:t>
             </a:r>
           </a:p>
           <a:p>
             <a:pPr lvl="4"/>
             <a:r>
-              <a:rPr lang="ko-KR" altLang="en-US" smtClean="0"/>
+              <a:rPr lang="ko-KR" altLang="en-US"/>
               <a:t>다섯째 수준</a:t>
             </a:r>
-            <a:endParaRPr lang="ko-KR" altLang="en-US"/>
           </a:p>
         </p:txBody>
       </p:sp>
@@ -2567,7 +2551,7 @@
           <a:p>
             <a:fld id="{7A210019-F0D1-4899-9B97-B63D89A03EBA}" type="datetimeFigureOut">
               <a:rPr lang="ko-KR" altLang="en-US" smtClean="0"/>
-              <a:t>2018-11-22</a:t>
+              <a:t>2018-11-25</a:t>
             </a:fld>
             <a:endParaRPr lang="ko-KR" altLang="en-US"/>
           </a:p>
@@ -2988,7 +2972,7 @@
           <a:lstStyle/>
           <a:p>
             <a:r>
-              <a:rPr lang="en-US" altLang="ko-KR" dirty="0" smtClean="0"/>
+              <a:rPr lang="en-US" altLang="ko-KR" dirty="0"/>
               <a:t>1122</a:t>
             </a:r>
             <a:endParaRPr lang="ko-KR" altLang="en-US" dirty="0"/>
@@ -3044,25 +3028,6 @@
           <a:chExt cx="0" cy="0"/>
         </a:xfrm>
       </p:grpSpPr>
-      <p:sp>
-        <p:nvSpPr>
-          <p:cNvPr id="2" name="제목 1"/>
-          <p:cNvSpPr>
-            <a:spLocks noGrp="1"/>
-          </p:cNvSpPr>
-          <p:nvPr>
-            <p:ph type="title"/>
-          </p:nvPr>
-        </p:nvSpPr>
-        <p:spPr/>
-        <p:txBody>
-          <a:bodyPr/>
-          <a:lstStyle/>
-          <a:p>
-            <a:endParaRPr lang="ko-KR" altLang="en-US"/>
-          </a:p>
-        </p:txBody>
-      </p:sp>
       <p:pic>
         <p:nvPicPr>
           <p:cNvPr id="3" name="그림 2"/>
@@ -3079,7 +3044,7 @@
         </p:blipFill>
         <p:spPr>
           <a:xfrm>
-            <a:off x="177799" y="365125"/>
+            <a:off x="0" y="786230"/>
             <a:ext cx="11344275" cy="6378850"/>
           </a:xfrm>
           <a:prstGeom prst="rect">
@@ -3087,6 +3052,37 @@
           </a:prstGeom>
         </p:spPr>
       </p:pic>
+      <p:sp>
+        <p:nvSpPr>
+          <p:cNvPr id="2" name="제목 1"/>
+          <p:cNvSpPr>
+            <a:spLocks noGrp="1"/>
+          </p:cNvSpPr>
+          <p:nvPr>
+            <p:ph type="title"/>
+          </p:nvPr>
+        </p:nvSpPr>
+        <p:spPr>
+          <a:xfrm>
+            <a:off x="125662" y="-176296"/>
+            <a:ext cx="10515600" cy="1325563"/>
+          </a:xfrm>
+        </p:spPr>
+        <p:txBody>
+          <a:bodyPr/>
+          <a:lstStyle/>
+          <a:p>
+            <a:r>
+              <a:rPr lang="ko-KR" altLang="en-US" dirty="0" err="1"/>
+              <a:t>컨텍스트메뉴를</a:t>
+            </a:r>
+            <a:r>
+              <a:rPr lang="ko-KR" altLang="en-US" dirty="0"/>
+              <a:t> 만들어보자</a:t>
+            </a:r>
+          </a:p>
+        </p:txBody>
+      </p:sp>
     </p:spTree>
     <p:extLst>
       <p:ext uri="{BB962C8B-B14F-4D97-AF65-F5344CB8AC3E}">
@@ -3230,14 +3226,13 @@
           <a:lstStyle/>
           <a:p>
             <a:r>
-              <a:rPr lang="en-US" altLang="ko-KR" dirty="0" smtClean="0"/>
+              <a:rPr lang="en-US" altLang="ko-KR" dirty="0"/>
               <a:t>8</a:t>
             </a:r>
             <a:r>
-              <a:rPr lang="ko-KR" altLang="en-US" dirty="0" smtClean="0"/>
+              <a:rPr lang="ko-KR" altLang="en-US" dirty="0"/>
               <a:t>장</a:t>
             </a:r>
-            <a:endParaRPr lang="ko-KR" altLang="en-US" dirty="0"/>
           </a:p>
         </p:txBody>
       </p:sp>
@@ -3384,14 +3379,13 @@
           <a:lstStyle/>
           <a:p>
             <a:r>
-              <a:rPr lang="ko-KR" altLang="en-US" dirty="0" err="1" smtClean="0"/>
+              <a:rPr lang="ko-KR" altLang="en-US" dirty="0" err="1"/>
               <a:t>남꺼를</a:t>
             </a:r>
             <a:r>
-              <a:rPr lang="ko-KR" altLang="en-US" dirty="0" smtClean="0"/>
+              <a:rPr lang="ko-KR" altLang="en-US" dirty="0"/>
               <a:t> 절대 건드리지 말아야할 경우</a:t>
             </a:r>
-            <a:endParaRPr lang="ko-KR" altLang="en-US" dirty="0"/>
           </a:p>
         </p:txBody>
       </p:sp>
@@ -3441,35 +3435,35 @@
           <a:lstStyle/>
           <a:p>
             <a:r>
-              <a:rPr lang="ko-KR" altLang="en-US" dirty="0" smtClean="0"/>
+              <a:rPr lang="ko-KR" altLang="en-US" dirty="0"/>
               <a:t>시스템 자원</a:t>
             </a:r>
             <a:r>
-              <a:rPr lang="en-US" altLang="ko-KR" dirty="0" smtClean="0"/>
+              <a:rPr lang="en-US" altLang="ko-KR" dirty="0"/>
               <a:t>(</a:t>
             </a:r>
             <a:r>
-              <a:rPr lang="ko-KR" altLang="en-US" dirty="0" smtClean="0"/>
+              <a:rPr lang="ko-KR" altLang="en-US" dirty="0"/>
               <a:t>전화번호</a:t>
             </a:r>
             <a:r>
-              <a:rPr lang="en-US" altLang="ko-KR" dirty="0" smtClean="0"/>
+              <a:rPr lang="en-US" altLang="ko-KR" dirty="0"/>
               <a:t>, </a:t>
             </a:r>
             <a:r>
-              <a:rPr lang="ko-KR" altLang="en-US" dirty="0" smtClean="0"/>
+              <a:rPr lang="ko-KR" altLang="en-US" dirty="0"/>
               <a:t>카메라</a:t>
             </a:r>
             <a:r>
-              <a:rPr lang="en-US" altLang="ko-KR" dirty="0" smtClean="0"/>
+              <a:rPr lang="en-US" altLang="ko-KR" dirty="0"/>
               <a:t>)</a:t>
             </a:r>
             <a:r>
-              <a:rPr lang="ko-KR" altLang="en-US" dirty="0" smtClean="0"/>
+              <a:rPr lang="ko-KR" altLang="en-US" dirty="0"/>
               <a:t>을 </a:t>
             </a:r>
             <a:r>
-              <a:rPr lang="ko-KR" altLang="en-US" dirty="0" err="1" smtClean="0"/>
+              <a:rPr lang="ko-KR" altLang="en-US" dirty="0" err="1"/>
               <a:t>필요로할때</a:t>
             </a:r>
             <a:endParaRPr lang="ko-KR" altLang="en-US" dirty="0"/>

</xml_diff>